<commit_message>
Made the FAQ more potent (Added real cases and how to solve them. changed added tags to the support giver ticket oppening screen, added the communication type to the ERD
</commit_message>
<xml_diff>
--- a/Documentation & Design/ERD.pptx
+++ b/Documentation & Design/ERD.pptx
@@ -104,6 +104,22 @@
       </a:defRPr>
     </a:lvl9pPr>
   </p:defaultTextStyle>
+  <p:extLst>
+    <p:ext uri="{EFAFB233-063F-42B5-8137-9DF3F51BA10A}">
+      <p15:sldGuideLst xmlns:p15="http://schemas.microsoft.com/office/powerpoint/2012/main">
+        <p15:guide id="1" orient="horz" pos="2160">
+          <p15:clr>
+            <a:srgbClr val="A4A3A4"/>
+          </p15:clr>
+        </p15:guide>
+        <p15:guide id="2" pos="2880">
+          <p15:clr>
+            <a:srgbClr val="A4A3A4"/>
+          </p15:clr>
+        </p15:guide>
+      </p15:sldGuideLst>
+    </p:ext>
+  </p:extLst>
 </p:presentation>
 </file>
 
@@ -288,7 +304,7 @@
           <a:p>
             <a:fld id="{AFE67C6B-C9B1-49FA-82EA-4EBF386A56BB}" type="datetimeFigureOut">
               <a:rPr lang="en-US" smtClean="0"/>
-              <a:t>05-Nov-18</a:t>
+              <a:t>11/26/2018</a:t>
             </a:fld>
             <a:endParaRPr lang="en-US"/>
           </a:p>
@@ -458,7 +474,7 @@
           <a:p>
             <a:fld id="{AFE67C6B-C9B1-49FA-82EA-4EBF386A56BB}" type="datetimeFigureOut">
               <a:rPr lang="en-US" smtClean="0"/>
-              <a:t>05-Nov-18</a:t>
+              <a:t>11/26/2018</a:t>
             </a:fld>
             <a:endParaRPr lang="en-US"/>
           </a:p>
@@ -638,7 +654,7 @@
           <a:p>
             <a:fld id="{AFE67C6B-C9B1-49FA-82EA-4EBF386A56BB}" type="datetimeFigureOut">
               <a:rPr lang="en-US" smtClean="0"/>
-              <a:t>05-Nov-18</a:t>
+              <a:t>11/26/2018</a:t>
             </a:fld>
             <a:endParaRPr lang="en-US"/>
           </a:p>
@@ -808,7 +824,7 @@
           <a:p>
             <a:fld id="{AFE67C6B-C9B1-49FA-82EA-4EBF386A56BB}" type="datetimeFigureOut">
               <a:rPr lang="en-US" smtClean="0"/>
-              <a:t>05-Nov-18</a:t>
+              <a:t>11/26/2018</a:t>
             </a:fld>
             <a:endParaRPr lang="en-US"/>
           </a:p>
@@ -1054,7 +1070,7 @@
           <a:p>
             <a:fld id="{AFE67C6B-C9B1-49FA-82EA-4EBF386A56BB}" type="datetimeFigureOut">
               <a:rPr lang="en-US" smtClean="0"/>
-              <a:t>05-Nov-18</a:t>
+              <a:t>11/26/2018</a:t>
             </a:fld>
             <a:endParaRPr lang="en-US"/>
           </a:p>
@@ -1342,7 +1358,7 @@
           <a:p>
             <a:fld id="{AFE67C6B-C9B1-49FA-82EA-4EBF386A56BB}" type="datetimeFigureOut">
               <a:rPr lang="en-US" smtClean="0"/>
-              <a:t>05-Nov-18</a:t>
+              <a:t>11/26/2018</a:t>
             </a:fld>
             <a:endParaRPr lang="en-US"/>
           </a:p>
@@ -1764,7 +1780,7 @@
           <a:p>
             <a:fld id="{AFE67C6B-C9B1-49FA-82EA-4EBF386A56BB}" type="datetimeFigureOut">
               <a:rPr lang="en-US" smtClean="0"/>
-              <a:t>05-Nov-18</a:t>
+              <a:t>11/26/2018</a:t>
             </a:fld>
             <a:endParaRPr lang="en-US"/>
           </a:p>
@@ -1882,7 +1898,7 @@
           <a:p>
             <a:fld id="{AFE67C6B-C9B1-49FA-82EA-4EBF386A56BB}" type="datetimeFigureOut">
               <a:rPr lang="en-US" smtClean="0"/>
-              <a:t>05-Nov-18</a:t>
+              <a:t>11/26/2018</a:t>
             </a:fld>
             <a:endParaRPr lang="en-US"/>
           </a:p>
@@ -1977,7 +1993,7 @@
           <a:p>
             <a:fld id="{AFE67C6B-C9B1-49FA-82EA-4EBF386A56BB}" type="datetimeFigureOut">
               <a:rPr lang="en-US" smtClean="0"/>
-              <a:t>05-Nov-18</a:t>
+              <a:t>11/26/2018</a:t>
             </a:fld>
             <a:endParaRPr lang="en-US"/>
           </a:p>
@@ -2254,7 +2270,7 @@
           <a:p>
             <a:fld id="{AFE67C6B-C9B1-49FA-82EA-4EBF386A56BB}" type="datetimeFigureOut">
               <a:rPr lang="en-US" smtClean="0"/>
-              <a:t>05-Nov-18</a:t>
+              <a:t>11/26/2018</a:t>
             </a:fld>
             <a:endParaRPr lang="en-US"/>
           </a:p>
@@ -2507,7 +2523,7 @@
           <a:p>
             <a:fld id="{AFE67C6B-C9B1-49FA-82EA-4EBF386A56BB}" type="datetimeFigureOut">
               <a:rPr lang="en-US" smtClean="0"/>
-              <a:t>05-Nov-18</a:t>
+              <a:t>11/26/2018</a:t>
             </a:fld>
             <a:endParaRPr lang="en-US"/>
           </a:p>
@@ -2720,7 +2736,7 @@
           <a:p>
             <a:fld id="{AFE67C6B-C9B1-49FA-82EA-4EBF386A56BB}" type="datetimeFigureOut">
               <a:rPr lang="en-US" smtClean="0"/>
-              <a:t>05-Nov-18</a:t>
+              <a:t>11/26/2018</a:t>
             </a:fld>
             <a:endParaRPr lang="en-US"/>
           </a:p>
@@ -3298,7 +3314,7 @@
         <p:spPr>
           <a:xfrm>
             <a:off x="4996809" y="401584"/>
-            <a:ext cx="2057400" cy="3066233"/>
+            <a:ext cx="2057400" cy="3484616"/>
           </a:xfrm>
           <a:prstGeom prst="rect">
             <a:avLst/>
@@ -3478,6 +3494,25 @@
               </a:rPr>
               <a:t>Tags</a:t>
             </a:r>
+          </a:p>
+          <a:p>
+            <a:pPr marL="285750" indent="-285750">
+              <a:buFontTx/>
+              <a:buChar char="-"/>
+            </a:pPr>
+            <a:r>
+              <a:rPr lang="en-US" dirty="0" smtClean="0">
+                <a:solidFill>
+                  <a:sysClr val="windowText" lastClr="000000"/>
+                </a:solidFill>
+              </a:rPr>
+              <a:t>Media of Communication</a:t>
+            </a:r>
+            <a:endParaRPr lang="en-US" dirty="0" smtClean="0">
+              <a:solidFill>
+                <a:sysClr val="windowText" lastClr="000000"/>
+              </a:solidFill>
+            </a:endParaRPr>
           </a:p>
         </p:txBody>
       </p:sp>

</xml_diff>